<commit_message>
clean up blocks 1-4
</commit_message>
<xml_diff>
--- a/docs/files/Block1-3_OSF.pptx
+++ b/docs/files/Block1-3_OSF.pptx
@@ -27,21 +27,21 @@
   <p:notesSz cx="6858000" cy="9144000"/>
   <p:embeddedFontLst>
     <p:embeddedFont>
-      <p:font typeface="Average" panose="020B0604020202020204" charset="0"/>
+      <p:font typeface="Average" panose="020F0502020204030204" pitchFamily="34" charset="0"/>
       <p:regular r:id="rId17"/>
       <p:bold r:id="rId18"/>
       <p:italic r:id="rId19"/>
       <p:boldItalic r:id="rId20"/>
     </p:embeddedFont>
     <p:embeddedFont>
-      <p:font typeface="Nunito" pitchFamily="2" charset="0"/>
+      <p:font typeface="Nunito" pitchFamily="2" charset="77"/>
       <p:regular r:id="rId21"/>
       <p:bold r:id="rId22"/>
       <p:italic r:id="rId23"/>
       <p:boldItalic r:id="rId24"/>
     </p:embeddedFont>
     <p:embeddedFont>
-      <p:font typeface="Questrial" pitchFamily="2" charset="0"/>
+      <p:font typeface="Questrial" pitchFamily="2" charset="77"/>
       <p:regular r:id="rId25"/>
     </p:embeddedFont>
   </p:embeddedFontLst>
@@ -8416,29 +8416,12 @@
             </a:pPr>
             <a:r>
               <a:rPr lang="en-US" dirty="0"/>
-              <a:t>For this course there is a template set up for you to fork (copy), which can be found on the session webpage: </a:t>
+              <a:t>For this course there is a template set up for you to fork (copy), which can be found on the </a:t>
             </a:r>
             <a:r>
-              <a:rPr lang="en-US" dirty="0">
-                <a:highlight>
-                  <a:srgbClr val="FFFF00"/>
-                </a:highlight>
-              </a:rPr>
-              <a:t>insert link</a:t>
+              <a:rPr lang="en-US"/>
+              <a:t>session webpage.</a:t>
             </a:r>
-          </a:p>
-          <a:p>
-            <a:pPr marL="0" lvl="0" indent="0" algn="l" rtl="0">
-              <a:lnSpc>
-                <a:spcPct val="150000"/>
-              </a:lnSpc>
-              <a:spcBef>
-                <a:spcPts val="0"/>
-              </a:spcBef>
-              <a:spcAft>
-                <a:spcPts val="0"/>
-              </a:spcAft>
-            </a:pPr>
             <a:endParaRPr lang="en-CA" sz="1600" dirty="0"/>
           </a:p>
           <a:p>

</xml_diff>